<commit_message>
minor typo fix in presentation deck
</commit_message>
<xml_diff>
--- a/archive/Reflektor Presentation Deck.pptx
+++ b/archive/Reflektor Presentation Deck.pptx
@@ -325,7 +325,7 @@
             <a:fld id="{1D8BD707-D9CF-40AE-B4C6-C98DA3205C09}" type="datetimeFigureOut">
               <a:rPr lang="en-US" smtClean="0"/>
               <a:pPr/>
-              <a:t>05/03/2025</a:t>
+              <a:t>05/04/2025</a:t>
             </a:fld>
             <a:endParaRPr lang="en-US"/>
           </a:p>
@@ -490,7 +490,7 @@
             <a:fld id="{1D8BD707-D9CF-40AE-B4C6-C98DA3205C09}" type="datetimeFigureOut">
               <a:rPr lang="en-US" smtClean="0"/>
               <a:pPr/>
-              <a:t>05/03/2025</a:t>
+              <a:t>05/04/2025</a:t>
             </a:fld>
             <a:endParaRPr lang="en-US"/>
           </a:p>
@@ -665,7 +665,7 @@
             <a:fld id="{1D8BD707-D9CF-40AE-B4C6-C98DA3205C09}" type="datetimeFigureOut">
               <a:rPr lang="en-US" smtClean="0"/>
               <a:pPr/>
-              <a:t>05/03/2025</a:t>
+              <a:t>05/04/2025</a:t>
             </a:fld>
             <a:endParaRPr lang="en-US"/>
           </a:p>
@@ -830,7 +830,7 @@
             <a:fld id="{1D8BD707-D9CF-40AE-B4C6-C98DA3205C09}" type="datetimeFigureOut">
               <a:rPr lang="en-US" smtClean="0"/>
               <a:pPr/>
-              <a:t>05/03/2025</a:t>
+              <a:t>05/04/2025</a:t>
             </a:fld>
             <a:endParaRPr lang="en-US"/>
           </a:p>
@@ -1072,7 +1072,7 @@
             <a:fld id="{1D8BD707-D9CF-40AE-B4C6-C98DA3205C09}" type="datetimeFigureOut">
               <a:rPr lang="en-US" smtClean="0"/>
               <a:pPr/>
-              <a:t>05/03/2025</a:t>
+              <a:t>05/04/2025</a:t>
             </a:fld>
             <a:endParaRPr lang="en-US"/>
           </a:p>
@@ -1354,7 +1354,7 @@
             <a:fld id="{1D8BD707-D9CF-40AE-B4C6-C98DA3205C09}" type="datetimeFigureOut">
               <a:rPr lang="en-US" smtClean="0"/>
               <a:pPr/>
-              <a:t>05/03/2025</a:t>
+              <a:t>05/04/2025</a:t>
             </a:fld>
             <a:endParaRPr lang="en-US"/>
           </a:p>
@@ -1770,7 +1770,7 @@
             <a:fld id="{1D8BD707-D9CF-40AE-B4C6-C98DA3205C09}" type="datetimeFigureOut">
               <a:rPr lang="en-US" smtClean="0"/>
               <a:pPr/>
-              <a:t>05/03/2025</a:t>
+              <a:t>05/04/2025</a:t>
             </a:fld>
             <a:endParaRPr lang="en-US"/>
           </a:p>
@@ -1884,7 +1884,7 @@
             <a:fld id="{1D8BD707-D9CF-40AE-B4C6-C98DA3205C09}" type="datetimeFigureOut">
               <a:rPr lang="en-US" smtClean="0"/>
               <a:pPr/>
-              <a:t>05/03/2025</a:t>
+              <a:t>05/04/2025</a:t>
             </a:fld>
             <a:endParaRPr lang="en-US"/>
           </a:p>
@@ -1976,7 +1976,7 @@
             <a:fld id="{1D8BD707-D9CF-40AE-B4C6-C98DA3205C09}" type="datetimeFigureOut">
               <a:rPr lang="en-US" smtClean="0"/>
               <a:pPr/>
-              <a:t>05/03/2025</a:t>
+              <a:t>05/04/2025</a:t>
             </a:fld>
             <a:endParaRPr lang="en-US"/>
           </a:p>
@@ -2248,7 +2248,7 @@
             <a:fld id="{1D8BD707-D9CF-40AE-B4C6-C98DA3205C09}" type="datetimeFigureOut">
               <a:rPr lang="en-US" smtClean="0"/>
               <a:pPr/>
-              <a:t>05/03/2025</a:t>
+              <a:t>05/04/2025</a:t>
             </a:fld>
             <a:endParaRPr lang="en-US"/>
           </a:p>
@@ -2497,7 +2497,7 @@
             <a:fld id="{1D8BD707-D9CF-40AE-B4C6-C98DA3205C09}" type="datetimeFigureOut">
               <a:rPr lang="en-US" smtClean="0"/>
               <a:pPr/>
-              <a:t>05/03/2025</a:t>
+              <a:t>05/04/2025</a:t>
             </a:fld>
             <a:endParaRPr lang="en-US"/>
           </a:p>
@@ -2705,7 +2705,7 @@
             <a:fld id="{1D8BD707-D9CF-40AE-B4C6-C98DA3205C09}" type="datetimeFigureOut">
               <a:rPr lang="en-US" smtClean="0"/>
               <a:pPr/>
-              <a:t>05/03/2025</a:t>
+              <a:t>05/04/2025</a:t>
             </a:fld>
             <a:endParaRPr lang="en-US"/>
           </a:p>
@@ -9418,7 +9418,7 @@
         <p:spPr>
           <a:xfrm>
             <a:off x="8797535" y="1199852"/>
-            <a:ext cx="7577565" cy="931794"/>
+            <a:ext cx="7997238" cy="931794"/>
           </a:xfrm>
           <a:prstGeom prst="rect">
             <a:avLst/>
@@ -9455,7 +9455,7 @@
                 <a:cs typeface="Arcade Gamer"/>
                 <a:sym typeface="Arcade Gamer"/>
               </a:rPr>
-              <a:t>Coding Approach</a:t>
+              <a:t>CODING APPROACH</a:t>
             </a:r>
           </a:p>
         </p:txBody>

</xml_diff>